<commit_message>
Completados tests y añadido controlador
</commit_message>
<xml_diff>
--- a/FP Dual - Desarrollar módulos o programas de ámbito general.pptx
+++ b/FP Dual - Desarrollar módulos o programas de ámbito general.pptx
@@ -273,7 +273,7 @@
               <a:pPr>
                 <a:defRPr/>
               </a:pPr>
-              <a:t>20/03/2018</a:t>
+              <a:t>23/03/2018</a:t>
             </a:fld>
             <a:endParaRPr lang="fr-FR"/>
           </a:p>
@@ -492,7 +492,7 @@
               <a:pPr>
                 <a:defRPr/>
               </a:pPr>
-              <a:t>20/03/2018</a:t>
+              <a:t>23/03/2018</a:t>
             </a:fld>
             <a:endParaRPr lang="fr-FR"/>
           </a:p>
@@ -1294,7 +1294,7 @@
             </a:pPr>
             <a:fld id="{BEDFDCAD-79B2-49A7-84F3-F37C65B12F37}" type="datetime5">
               <a:rPr lang="es-ES_tradnl" smtClean="0"/>
-              <a:t>20-mar-18</a:t>
+              <a:t>23-mar-18</a:t>
             </a:fld>
             <a:endParaRPr lang="fr-FR" dirty="0"/>
           </a:p>
@@ -1758,7 +1758,7 @@
             </a:pPr>
             <a:fld id="{80E1E75F-ED9C-4FE6-86DE-12F9655AEE8B}" type="datetime5">
               <a:rPr lang="es-ES_tradnl" smtClean="0"/>
-              <a:t>20-mar-18</a:t>
+              <a:t>23-mar-18</a:t>
             </a:fld>
             <a:endParaRPr lang="fr-FR" dirty="0"/>
           </a:p>
@@ -2222,7 +2222,7 @@
             </a:pPr>
             <a:fld id="{281BB3E7-EC44-43C8-8B8A-51B979E508C1}" type="datetime5">
               <a:rPr lang="es-ES_tradnl" smtClean="0"/>
-              <a:t>20-mar-18</a:t>
+              <a:t>23-mar-18</a:t>
             </a:fld>
             <a:endParaRPr lang="fr-FR" dirty="0"/>
           </a:p>
@@ -2686,7 +2686,7 @@
             </a:pPr>
             <a:fld id="{338508A2-4220-4C7F-BF7F-DD6951355C08}" type="datetime5">
               <a:rPr lang="es-ES_tradnl" smtClean="0"/>
-              <a:t>20-mar-18</a:t>
+              <a:t>23-mar-18</a:t>
             </a:fld>
             <a:endParaRPr lang="fr-FR" dirty="0"/>
           </a:p>
@@ -3073,7 +3073,7 @@
             </a:pPr>
             <a:fld id="{E3F14906-748A-4C3C-983B-6C0032B77CBB}" type="datetime5">
               <a:rPr lang="es-ES_tradnl" smtClean="0"/>
-              <a:t>20-mar-18</a:t>
+              <a:t>23-mar-18</a:t>
             </a:fld>
             <a:endParaRPr lang="fr-FR" dirty="0"/>
           </a:p>
@@ -3460,7 +3460,7 @@
             </a:pPr>
             <a:fld id="{FF470809-F837-4114-AC36-66D05FDB75E8}" type="datetime5">
               <a:rPr lang="es-ES_tradnl" smtClean="0"/>
-              <a:t>20-mar-18</a:t>
+              <a:t>23-mar-18</a:t>
             </a:fld>
             <a:endParaRPr lang="fr-FR" dirty="0"/>
           </a:p>
@@ -3847,7 +3847,7 @@
             </a:pPr>
             <a:fld id="{ECD74885-AEAD-41CA-8F97-C7149C66D384}" type="datetime5">
               <a:rPr lang="es-ES_tradnl" smtClean="0"/>
-              <a:t>20-mar-18</a:t>
+              <a:t>23-mar-18</a:t>
             </a:fld>
             <a:endParaRPr lang="fr-FR" dirty="0"/>
           </a:p>
@@ -4234,7 +4234,7 @@
             </a:pPr>
             <a:fld id="{E2B6338C-15BE-454E-B45F-87ACF5B1F996}" type="datetime5">
               <a:rPr lang="es-ES_tradnl" smtClean="0"/>
-              <a:t>20-mar-18</a:t>
+              <a:t>23-mar-18</a:t>
             </a:fld>
             <a:endParaRPr lang="fr-FR" dirty="0"/>
           </a:p>
@@ -4769,7 +4769,7 @@
             </a:pPr>
             <a:fld id="{DA7CE4FC-10DA-40FB-88D5-0357CAC62C25}" type="datetime5">
               <a:rPr lang="es-ES_tradnl" smtClean="0"/>
-              <a:t>20-mar-18</a:t>
+              <a:t>23-mar-18</a:t>
             </a:fld>
             <a:endParaRPr lang="fr-FR" dirty="0"/>
           </a:p>
@@ -5307,7 +5307,7 @@
             </a:pPr>
             <a:fld id="{351A2961-124E-4830-8FB3-3FD19BD49CFD}" type="datetime5">
               <a:rPr lang="es-ES_tradnl" smtClean="0"/>
-              <a:t>20-mar-18</a:t>
+              <a:t>23-mar-18</a:t>
             </a:fld>
             <a:endParaRPr lang="fr-FR" dirty="0"/>
           </a:p>
@@ -5721,7 +5721,7 @@
             </a:pPr>
             <a:fld id="{EEEADD86-E0F4-498E-B6AE-9EB02D87BD87}" type="datetime5">
               <a:rPr lang="es-ES_tradnl" smtClean="0"/>
-              <a:t>20-mar-18</a:t>
+              <a:t>23-mar-18</a:t>
             </a:fld>
             <a:endParaRPr lang="fr-FR" dirty="0"/>
           </a:p>
@@ -6161,7 +6161,7 @@
             </a:pPr>
             <a:fld id="{6A0A7A46-7084-4936-AB65-1E4B7A3FEE0C}" type="datetime5">
               <a:rPr lang="es-ES_tradnl" smtClean="0"/>
-              <a:t>20-mar-18</a:t>
+              <a:t>23-mar-18</a:t>
             </a:fld>
             <a:endParaRPr lang="fr-FR" dirty="0"/>
           </a:p>
@@ -6699,7 +6699,7 @@
             </a:pPr>
             <a:fld id="{89913956-6B8C-4BFB-A34B-21CCFA50EC56}" type="datetime5">
               <a:rPr lang="es-ES_tradnl" smtClean="0"/>
-              <a:t>20-mar-18</a:t>
+              <a:t>23-mar-18</a:t>
             </a:fld>
             <a:endParaRPr lang="fr-FR" dirty="0"/>
           </a:p>
@@ -7408,7 +7408,7 @@
             </a:pPr>
             <a:fld id="{D1E630D5-8C5A-49CB-95C1-B2AEF7EBD1B8}" type="datetime5">
               <a:rPr lang="es-ES_tradnl" smtClean="0"/>
-              <a:t>20-mar-18</a:t>
+              <a:t>23-mar-18</a:t>
             </a:fld>
             <a:endParaRPr lang="fr-FR" dirty="0"/>
           </a:p>
@@ -7724,7 +7724,7 @@
             </a:pPr>
             <a:fld id="{6959F5A0-58A1-425A-AB29-D47619E0E183}" type="datetime5">
               <a:rPr lang="es-ES_tradnl" smtClean="0"/>
-              <a:t>20-mar-18</a:t>
+              <a:t>23-mar-18</a:t>
             </a:fld>
             <a:endParaRPr lang="fr-FR" dirty="0"/>
           </a:p>
@@ -8040,7 +8040,7 @@
             </a:pPr>
             <a:fld id="{D2EE8776-04CA-4692-853E-1A2A70628423}" type="datetime5">
               <a:rPr lang="es-ES_tradnl" smtClean="0"/>
-              <a:t>20-mar-18</a:t>
+              <a:t>23-mar-18</a:t>
             </a:fld>
             <a:endParaRPr lang="fr-FR" dirty="0"/>
           </a:p>
@@ -8296,7 +8296,7 @@
             </a:pPr>
             <a:fld id="{F363B1EB-31CC-4D4A-A0E0-9CD4E30593B2}" type="datetime5">
               <a:rPr lang="es-ES_tradnl" smtClean="0"/>
-              <a:t>20-mar-18</a:t>
+              <a:t>23-mar-18</a:t>
             </a:fld>
             <a:endParaRPr lang="fr-FR" dirty="0"/>
           </a:p>
@@ -8650,7 +8650,7 @@
             </a:pPr>
             <a:fld id="{127C1A29-7C20-4E45-81DC-625005270F0B}" type="datetime5">
               <a:rPr lang="es-ES_tradnl" smtClean="0"/>
-              <a:t>20-mar-18</a:t>
+              <a:t>23-mar-18</a:t>
             </a:fld>
             <a:endParaRPr lang="fr-FR" dirty="0"/>
           </a:p>
@@ -9004,7 +9004,7 @@
             </a:pPr>
             <a:fld id="{34973F92-AF15-4B60-95A5-2E81EA1D2C08}" type="datetime5">
               <a:rPr lang="es-ES_tradnl" smtClean="0"/>
-              <a:t>20-mar-18</a:t>
+              <a:t>23-mar-18</a:t>
             </a:fld>
             <a:endParaRPr lang="fr-FR" dirty="0"/>
           </a:p>
@@ -9358,7 +9358,7 @@
             </a:pPr>
             <a:fld id="{F5781FFE-52DC-450E-9971-7E37493042EA}" type="datetime5">
               <a:rPr lang="es-ES_tradnl" smtClean="0"/>
-              <a:t>20-mar-18</a:t>
+              <a:t>23-mar-18</a:t>
             </a:fld>
             <a:endParaRPr lang="fr-FR" dirty="0"/>
           </a:p>
@@ -9891,7 +9891,7 @@
             </a:pPr>
             <a:fld id="{ADBDC9D5-727D-495C-B956-8628EA6CD57F}" type="datetime5">
               <a:rPr lang="es-ES_tradnl" smtClean="0"/>
-              <a:t>20-mar-18</a:t>
+              <a:t>23-mar-18</a:t>
             </a:fld>
             <a:endParaRPr lang="fr-FR" dirty="0"/>
           </a:p>
@@ -10622,7 +10622,7 @@
           <p:cNvPr id="6" name="Título 5">
             <a:extLst>
               <a:ext uri="{FF2B5EF4-FFF2-40B4-BE49-F238E27FC236}">
-                <a16:creationId xmlns:a16="http://schemas.microsoft.com/office/drawing/2014/main" xmlns="" id="{37354897-3206-4B07-BCB0-105F1C88EBF1}"/>
+                <a16:creationId xmlns="" xmlns:a16="http://schemas.microsoft.com/office/drawing/2014/main" id="{37354897-3206-4B07-BCB0-105F1C88EBF1}"/>
               </a:ext>
             </a:extLst>
           </p:cNvPr>
@@ -10651,7 +10651,7 @@
           <p:cNvPr id="3" name="Marcador de fecha 2">
             <a:extLst>
               <a:ext uri="{FF2B5EF4-FFF2-40B4-BE49-F238E27FC236}">
-                <a16:creationId xmlns:a16="http://schemas.microsoft.com/office/drawing/2014/main" xmlns="" id="{6EC7A875-C25A-4862-991B-04B0C295ACB8}"/>
+                <a16:creationId xmlns="" xmlns:a16="http://schemas.microsoft.com/office/drawing/2014/main" id="{6EC7A875-C25A-4862-991B-04B0C295ACB8}"/>
               </a:ext>
             </a:extLst>
           </p:cNvPr>
@@ -10672,7 +10672,7 @@
             </a:pPr>
             <a:fld id="{EEEADD86-E0F4-498E-B6AE-9EB02D87BD87}" type="datetime5">
               <a:rPr lang="es-ES_tradnl" smtClean="0"/>
-              <a:t>20-mar-18</a:t>
+              <a:t>23-mar-18</a:t>
             </a:fld>
             <a:endParaRPr lang="fr-FR" dirty="0"/>
           </a:p>
@@ -10683,7 +10683,7 @@
           <p:cNvPr id="5" name="Marcador de número de diapositiva 4">
             <a:extLst>
               <a:ext uri="{FF2B5EF4-FFF2-40B4-BE49-F238E27FC236}">
-                <a16:creationId xmlns:a16="http://schemas.microsoft.com/office/drawing/2014/main" xmlns="" id="{720BA5B6-A91E-4777-A687-FED3200D58F0}"/>
+                <a16:creationId xmlns="" xmlns:a16="http://schemas.microsoft.com/office/drawing/2014/main" id="{720BA5B6-A91E-4777-A687-FED3200D58F0}"/>
               </a:ext>
             </a:extLst>
           </p:cNvPr>
@@ -10718,7 +10718,7 @@
           <p:cNvPr id="7" name="Marcador de contenido 6">
             <a:extLst>
               <a:ext uri="{FF2B5EF4-FFF2-40B4-BE49-F238E27FC236}">
-                <a16:creationId xmlns:a16="http://schemas.microsoft.com/office/drawing/2014/main" xmlns="" id="{820906D2-6508-46F3-9655-737CE7532C6B}"/>
+                <a16:creationId xmlns="" xmlns:a16="http://schemas.microsoft.com/office/drawing/2014/main" id="{820906D2-6508-46F3-9655-737CE7532C6B}"/>
               </a:ext>
             </a:extLst>
           </p:cNvPr>
@@ -10844,11 +10844,7 @@
             </a:r>
             <a:r>
               <a:rPr lang="es-ES" dirty="0" smtClean="0"/>
-              <a:t> </a:t>
-            </a:r>
-            <a:r>
-              <a:rPr lang="es-ES" dirty="0" smtClean="0"/>
-              <a:t>unitarios, Calidad del código-</a:t>
+              <a:t> unitarios, Calidad del código-</a:t>
             </a:r>
             <a:r>
               <a:rPr lang="es-ES" dirty="0" err="1" smtClean="0"/>
@@ -10989,7 +10985,6 @@
               <a:rPr lang="es-ES" dirty="0" smtClean="0"/>
               <a:t>Servicios.    (Documento y Expediente – alta/modificación/eliminación). TDD      </a:t>
             </a:r>
-            <a:endParaRPr lang="es-ES" dirty="0" smtClean="0"/>
           </a:p>
           <a:p>
             <a:pPr>
@@ -10998,11 +10993,7 @@
             </a:pPr>
             <a:r>
               <a:rPr lang="es-ES" dirty="0" smtClean="0"/>
-              <a:t>Controlador API REST</a:t>
-            </a:r>
-            <a:r>
-              <a:rPr lang="es-ES" dirty="0" smtClean="0"/>
-              <a:t>                                                                                                                    </a:t>
+              <a:t>Controlador API REST                                                                                                                    </a:t>
             </a:r>
             <a:endParaRPr lang="es-ES" dirty="0"/>
           </a:p>

</xml_diff>

<commit_message>
Actualziada ppt y añadido POST al controller para eliminar documentos
</commit_message>
<xml_diff>
--- a/FP Dual - Desarrollar módulos o programas de ámbito general.pptx
+++ b/FP Dual - Desarrollar módulos o programas de ámbito general.pptx
@@ -5,14 +5,16 @@
     <p:sldMasterId id="2147483648" r:id="rId1"/>
   </p:sldMasterIdLst>
   <p:notesMasterIdLst>
-    <p:notesMasterId r:id="rId4"/>
+    <p:notesMasterId r:id="rId6"/>
   </p:notesMasterIdLst>
   <p:handoutMasterIdLst>
-    <p:handoutMasterId r:id="rId5"/>
+    <p:handoutMasterId r:id="rId7"/>
   </p:handoutMasterIdLst>
   <p:sldIdLst>
     <p:sldId id="256" r:id="rId2"/>
     <p:sldId id="258" r:id="rId3"/>
+    <p:sldId id="259" r:id="rId4"/>
+    <p:sldId id="260" r:id="rId5"/>
   </p:sldIdLst>
   <p:sldSz cx="12192000" cy="6858000"/>
   <p:notesSz cx="6858000" cy="9144000"/>
@@ -273,7 +275,7 @@
               <a:pPr>
                 <a:defRPr/>
               </a:pPr>
-              <a:t>23/03/2018</a:t>
+              <a:t>26/03/2018</a:t>
             </a:fld>
             <a:endParaRPr lang="fr-FR"/>
           </a:p>
@@ -492,7 +494,7 @@
               <a:pPr>
                 <a:defRPr/>
               </a:pPr>
-              <a:t>23/03/2018</a:t>
+              <a:t>26/03/2018</a:t>
             </a:fld>
             <a:endParaRPr lang="fr-FR"/>
           </a:p>
@@ -1294,7 +1296,7 @@
             </a:pPr>
             <a:fld id="{BEDFDCAD-79B2-49A7-84F3-F37C65B12F37}" type="datetime5">
               <a:rPr lang="es-ES_tradnl" smtClean="0"/>
-              <a:t>23-mar-18</a:t>
+              <a:t>26-mar-18</a:t>
             </a:fld>
             <a:endParaRPr lang="fr-FR" dirty="0"/>
           </a:p>
@@ -1758,7 +1760,7 @@
             </a:pPr>
             <a:fld id="{80E1E75F-ED9C-4FE6-86DE-12F9655AEE8B}" type="datetime5">
               <a:rPr lang="es-ES_tradnl" smtClean="0"/>
-              <a:t>23-mar-18</a:t>
+              <a:t>26-mar-18</a:t>
             </a:fld>
             <a:endParaRPr lang="fr-FR" dirty="0"/>
           </a:p>
@@ -2222,7 +2224,7 @@
             </a:pPr>
             <a:fld id="{281BB3E7-EC44-43C8-8B8A-51B979E508C1}" type="datetime5">
               <a:rPr lang="es-ES_tradnl" smtClean="0"/>
-              <a:t>23-mar-18</a:t>
+              <a:t>26-mar-18</a:t>
             </a:fld>
             <a:endParaRPr lang="fr-FR" dirty="0"/>
           </a:p>
@@ -2686,7 +2688,7 @@
             </a:pPr>
             <a:fld id="{338508A2-4220-4C7F-BF7F-DD6951355C08}" type="datetime5">
               <a:rPr lang="es-ES_tradnl" smtClean="0"/>
-              <a:t>23-mar-18</a:t>
+              <a:t>26-mar-18</a:t>
             </a:fld>
             <a:endParaRPr lang="fr-FR" dirty="0"/>
           </a:p>
@@ -3073,7 +3075,7 @@
             </a:pPr>
             <a:fld id="{E3F14906-748A-4C3C-983B-6C0032B77CBB}" type="datetime5">
               <a:rPr lang="es-ES_tradnl" smtClean="0"/>
-              <a:t>23-mar-18</a:t>
+              <a:t>26-mar-18</a:t>
             </a:fld>
             <a:endParaRPr lang="fr-FR" dirty="0"/>
           </a:p>
@@ -3460,7 +3462,7 @@
             </a:pPr>
             <a:fld id="{FF470809-F837-4114-AC36-66D05FDB75E8}" type="datetime5">
               <a:rPr lang="es-ES_tradnl" smtClean="0"/>
-              <a:t>23-mar-18</a:t>
+              <a:t>26-mar-18</a:t>
             </a:fld>
             <a:endParaRPr lang="fr-FR" dirty="0"/>
           </a:p>
@@ -3847,7 +3849,7 @@
             </a:pPr>
             <a:fld id="{ECD74885-AEAD-41CA-8F97-C7149C66D384}" type="datetime5">
               <a:rPr lang="es-ES_tradnl" smtClean="0"/>
-              <a:t>23-mar-18</a:t>
+              <a:t>26-mar-18</a:t>
             </a:fld>
             <a:endParaRPr lang="fr-FR" dirty="0"/>
           </a:p>
@@ -4234,7 +4236,7 @@
             </a:pPr>
             <a:fld id="{E2B6338C-15BE-454E-B45F-87ACF5B1F996}" type="datetime5">
               <a:rPr lang="es-ES_tradnl" smtClean="0"/>
-              <a:t>23-mar-18</a:t>
+              <a:t>26-mar-18</a:t>
             </a:fld>
             <a:endParaRPr lang="fr-FR" dirty="0"/>
           </a:p>
@@ -4769,7 +4771,7 @@
             </a:pPr>
             <a:fld id="{DA7CE4FC-10DA-40FB-88D5-0357CAC62C25}" type="datetime5">
               <a:rPr lang="es-ES_tradnl" smtClean="0"/>
-              <a:t>23-mar-18</a:t>
+              <a:t>26-mar-18</a:t>
             </a:fld>
             <a:endParaRPr lang="fr-FR" dirty="0"/>
           </a:p>
@@ -5307,7 +5309,7 @@
             </a:pPr>
             <a:fld id="{351A2961-124E-4830-8FB3-3FD19BD49CFD}" type="datetime5">
               <a:rPr lang="es-ES_tradnl" smtClean="0"/>
-              <a:t>23-mar-18</a:t>
+              <a:t>26-mar-18</a:t>
             </a:fld>
             <a:endParaRPr lang="fr-FR" dirty="0"/>
           </a:p>
@@ -5721,7 +5723,7 @@
             </a:pPr>
             <a:fld id="{EEEADD86-E0F4-498E-B6AE-9EB02D87BD87}" type="datetime5">
               <a:rPr lang="es-ES_tradnl" smtClean="0"/>
-              <a:t>23-mar-18</a:t>
+              <a:t>26-mar-18</a:t>
             </a:fld>
             <a:endParaRPr lang="fr-FR" dirty="0"/>
           </a:p>
@@ -6161,7 +6163,7 @@
             </a:pPr>
             <a:fld id="{6A0A7A46-7084-4936-AB65-1E4B7A3FEE0C}" type="datetime5">
               <a:rPr lang="es-ES_tradnl" smtClean="0"/>
-              <a:t>23-mar-18</a:t>
+              <a:t>26-mar-18</a:t>
             </a:fld>
             <a:endParaRPr lang="fr-FR" dirty="0"/>
           </a:p>
@@ -6699,7 +6701,7 @@
             </a:pPr>
             <a:fld id="{89913956-6B8C-4BFB-A34B-21CCFA50EC56}" type="datetime5">
               <a:rPr lang="es-ES_tradnl" smtClean="0"/>
-              <a:t>23-mar-18</a:t>
+              <a:t>26-mar-18</a:t>
             </a:fld>
             <a:endParaRPr lang="fr-FR" dirty="0"/>
           </a:p>
@@ -7408,7 +7410,7 @@
             </a:pPr>
             <a:fld id="{D1E630D5-8C5A-49CB-95C1-B2AEF7EBD1B8}" type="datetime5">
               <a:rPr lang="es-ES_tradnl" smtClean="0"/>
-              <a:t>23-mar-18</a:t>
+              <a:t>26-mar-18</a:t>
             </a:fld>
             <a:endParaRPr lang="fr-FR" dirty="0"/>
           </a:p>
@@ -7724,7 +7726,7 @@
             </a:pPr>
             <a:fld id="{6959F5A0-58A1-425A-AB29-D47619E0E183}" type="datetime5">
               <a:rPr lang="es-ES_tradnl" smtClean="0"/>
-              <a:t>23-mar-18</a:t>
+              <a:t>26-mar-18</a:t>
             </a:fld>
             <a:endParaRPr lang="fr-FR" dirty="0"/>
           </a:p>
@@ -8040,7 +8042,7 @@
             </a:pPr>
             <a:fld id="{D2EE8776-04CA-4692-853E-1A2A70628423}" type="datetime5">
               <a:rPr lang="es-ES_tradnl" smtClean="0"/>
-              <a:t>23-mar-18</a:t>
+              <a:t>26-mar-18</a:t>
             </a:fld>
             <a:endParaRPr lang="fr-FR" dirty="0"/>
           </a:p>
@@ -8296,7 +8298,7 @@
             </a:pPr>
             <a:fld id="{F363B1EB-31CC-4D4A-A0E0-9CD4E30593B2}" type="datetime5">
               <a:rPr lang="es-ES_tradnl" smtClean="0"/>
-              <a:t>23-mar-18</a:t>
+              <a:t>26-mar-18</a:t>
             </a:fld>
             <a:endParaRPr lang="fr-FR" dirty="0"/>
           </a:p>
@@ -8650,7 +8652,7 @@
             </a:pPr>
             <a:fld id="{127C1A29-7C20-4E45-81DC-625005270F0B}" type="datetime5">
               <a:rPr lang="es-ES_tradnl" smtClean="0"/>
-              <a:t>23-mar-18</a:t>
+              <a:t>26-mar-18</a:t>
             </a:fld>
             <a:endParaRPr lang="fr-FR" dirty="0"/>
           </a:p>
@@ -9004,7 +9006,7 @@
             </a:pPr>
             <a:fld id="{34973F92-AF15-4B60-95A5-2E81EA1D2C08}" type="datetime5">
               <a:rPr lang="es-ES_tradnl" smtClean="0"/>
-              <a:t>23-mar-18</a:t>
+              <a:t>26-mar-18</a:t>
             </a:fld>
             <a:endParaRPr lang="fr-FR" dirty="0"/>
           </a:p>
@@ -9358,7 +9360,7 @@
             </a:pPr>
             <a:fld id="{F5781FFE-52DC-450E-9971-7E37493042EA}" type="datetime5">
               <a:rPr lang="es-ES_tradnl" smtClean="0"/>
-              <a:t>23-mar-18</a:t>
+              <a:t>26-mar-18</a:t>
             </a:fld>
             <a:endParaRPr lang="fr-FR" dirty="0"/>
           </a:p>
@@ -9891,7 +9893,7 @@
             </a:pPr>
             <a:fld id="{ADBDC9D5-727D-495C-B956-8628EA6CD57F}" type="datetime5">
               <a:rPr lang="es-ES_tradnl" smtClean="0"/>
-              <a:t>23-mar-18</a:t>
+              <a:t>26-mar-18</a:t>
             </a:fld>
             <a:endParaRPr lang="fr-FR" dirty="0"/>
           </a:p>
@@ -10523,7 +10525,7 @@
         </p:nvSpPr>
         <p:spPr>
           <a:xfrm>
-            <a:off x="8374513" y="786275"/>
+            <a:off x="8297601" y="222252"/>
             <a:ext cx="3743654" cy="1477328"/>
           </a:xfrm>
           <a:prstGeom prst="rect">
@@ -10622,7 +10624,7 @@
           <p:cNvPr id="6" name="Título 5">
             <a:extLst>
               <a:ext uri="{FF2B5EF4-FFF2-40B4-BE49-F238E27FC236}">
-                <a16:creationId xmlns="" xmlns:a16="http://schemas.microsoft.com/office/drawing/2014/main" id="{37354897-3206-4B07-BCB0-105F1C88EBF1}"/>
+                <a16:creationId xmlns:a16="http://schemas.microsoft.com/office/drawing/2014/main" xmlns="" id="{37354897-3206-4B07-BCB0-105F1C88EBF1}"/>
               </a:ext>
             </a:extLst>
           </p:cNvPr>
@@ -10651,7 +10653,7 @@
           <p:cNvPr id="3" name="Marcador de fecha 2">
             <a:extLst>
               <a:ext uri="{FF2B5EF4-FFF2-40B4-BE49-F238E27FC236}">
-                <a16:creationId xmlns="" xmlns:a16="http://schemas.microsoft.com/office/drawing/2014/main" id="{6EC7A875-C25A-4862-991B-04B0C295ACB8}"/>
+                <a16:creationId xmlns:a16="http://schemas.microsoft.com/office/drawing/2014/main" xmlns="" id="{6EC7A875-C25A-4862-991B-04B0C295ACB8}"/>
               </a:ext>
             </a:extLst>
           </p:cNvPr>
@@ -10672,7 +10674,7 @@
             </a:pPr>
             <a:fld id="{EEEADD86-E0F4-498E-B6AE-9EB02D87BD87}" type="datetime5">
               <a:rPr lang="es-ES_tradnl" smtClean="0"/>
-              <a:t>23-mar-18</a:t>
+              <a:t>26-mar-18</a:t>
             </a:fld>
             <a:endParaRPr lang="fr-FR" dirty="0"/>
           </a:p>
@@ -10683,7 +10685,7 @@
           <p:cNvPr id="5" name="Marcador de número de diapositiva 4">
             <a:extLst>
               <a:ext uri="{FF2B5EF4-FFF2-40B4-BE49-F238E27FC236}">
-                <a16:creationId xmlns="" xmlns:a16="http://schemas.microsoft.com/office/drawing/2014/main" id="{720BA5B6-A91E-4777-A687-FED3200D58F0}"/>
+                <a16:creationId xmlns:a16="http://schemas.microsoft.com/office/drawing/2014/main" xmlns="" id="{720BA5B6-A91E-4777-A687-FED3200D58F0}"/>
               </a:ext>
             </a:extLst>
           </p:cNvPr>
@@ -10718,7 +10720,7 @@
           <p:cNvPr id="7" name="Marcador de contenido 6">
             <a:extLst>
               <a:ext uri="{FF2B5EF4-FFF2-40B4-BE49-F238E27FC236}">
-                <a16:creationId xmlns="" xmlns:a16="http://schemas.microsoft.com/office/drawing/2014/main" id="{820906D2-6508-46F3-9655-737CE7532C6B}"/>
+                <a16:creationId xmlns:a16="http://schemas.microsoft.com/office/drawing/2014/main" xmlns="" id="{820906D2-6508-46F3-9655-737CE7532C6B}"/>
               </a:ext>
             </a:extLst>
           </p:cNvPr>
@@ -10729,22 +10731,22 @@
             <p:ph idx="1"/>
           </p:nvPr>
         </p:nvSpPr>
-        <p:spPr/>
+        <p:spPr>
+          <a:xfrm>
+            <a:off x="838200" y="1233536"/>
+            <a:ext cx="10515600" cy="4996348"/>
+          </a:xfrm>
+        </p:spPr>
         <p:txBody>
           <a:bodyPr/>
           <a:lstStyle/>
           <a:p>
+            <a:endParaRPr lang="es-ES" dirty="0" smtClean="0"/>
+          </a:p>
+          <a:p>
             <a:r>
               <a:rPr lang="es-ES" dirty="0" smtClean="0"/>
-              <a:t>Estructura </a:t>
-            </a:r>
-            <a:r>
-              <a:rPr lang="es-ES" dirty="0"/>
-              <a:t>de </a:t>
-            </a:r>
-            <a:r>
-              <a:rPr lang="es-ES" dirty="0" smtClean="0"/>
-              <a:t>un proyecto.</a:t>
+              <a:t>Contenidos transversales. </a:t>
             </a:r>
           </a:p>
           <a:p>
@@ -10752,20 +10754,8 @@
               <a:buNone/>
             </a:pPr>
             <a:r>
-              <a:rPr lang="es-ES" dirty="0"/>
-              <a:t>	</a:t>
-            </a:r>
-            <a:r>
-              <a:rPr lang="es-ES" dirty="0" smtClean="0"/>
-              <a:t>1.1. </a:t>
-            </a:r>
-            <a:r>
-              <a:rPr lang="es-ES" dirty="0" err="1" smtClean="0"/>
-              <a:t>main</a:t>
-            </a:r>
-            <a:r>
-              <a:rPr lang="es-ES" dirty="0" smtClean="0"/>
-              <a:t> vs test.</a:t>
+              <a:rPr lang="es-ES" sz="1400" dirty="0" smtClean="0"/>
+              <a:t>	1.2. Código limpio.</a:t>
             </a:r>
           </a:p>
           <a:p>
@@ -10773,20 +10763,16 @@
               <a:buNone/>
             </a:pPr>
             <a:r>
-              <a:rPr lang="es-ES" dirty="0"/>
-              <a:t>	</a:t>
-            </a:r>
-            <a:r>
-              <a:rPr lang="es-ES" dirty="0" smtClean="0"/>
-              <a:t>1.2. java vs </a:t>
-            </a:r>
-            <a:r>
-              <a:rPr lang="es-ES" dirty="0" err="1" smtClean="0"/>
-              <a:t>resources</a:t>
-            </a:r>
-            <a:r>
-              <a:rPr lang="es-ES" dirty="0" smtClean="0"/>
-              <a:t>.</a:t>
+              <a:rPr lang="es-ES" sz="1400" dirty="0" smtClean="0"/>
+              <a:t>	1.2. </a:t>
+            </a:r>
+            <a:r>
+              <a:rPr lang="es-ES" sz="1400" dirty="0" err="1" smtClean="0"/>
+              <a:t>Tests</a:t>
+            </a:r>
+            <a:r>
+              <a:rPr lang="es-ES" sz="1400" dirty="0" smtClean="0"/>
+              <a:t> unitarios</a:t>
             </a:r>
           </a:p>
           <a:p>
@@ -10794,68 +10780,12 @@
               <a:buNone/>
             </a:pPr>
             <a:r>
-              <a:rPr lang="es-ES" dirty="0"/>
-              <a:t>	</a:t>
-            </a:r>
-            <a:r>
-              <a:rPr lang="es-ES" dirty="0" smtClean="0"/>
-              <a:t>1.3. Paquetes: modelo</a:t>
-            </a:r>
-            <a:r>
-              <a:rPr lang="es-ES" dirty="0"/>
-              <a:t>, repositorio y </a:t>
-            </a:r>
-            <a:r>
-              <a:rPr lang="es-ES" dirty="0" smtClean="0"/>
-              <a:t>servicio.</a:t>
-            </a:r>
-            <a:endParaRPr lang="es-ES" dirty="0"/>
-          </a:p>
-          <a:p>
-            <a:r>
-              <a:rPr lang="es-ES" dirty="0" smtClean="0"/>
-              <a:t>Creación de un proyecto con </a:t>
-            </a:r>
-            <a:r>
-              <a:rPr lang="es-ES" dirty="0" err="1" smtClean="0"/>
-              <a:t>SpringBoot</a:t>
-            </a:r>
-            <a:r>
-              <a:rPr lang="es-ES" dirty="0" smtClean="0"/>
-              <a:t> y </a:t>
-            </a:r>
-            <a:r>
-              <a:rPr lang="es-ES" dirty="0" err="1" smtClean="0"/>
-              <a:t>Maven</a:t>
-            </a:r>
-            <a:r>
-              <a:rPr lang="es-ES" dirty="0" smtClean="0"/>
-              <a:t>.</a:t>
-            </a:r>
-          </a:p>
-          <a:p>
-            <a:r>
-              <a:rPr lang="es-ES" dirty="0" smtClean="0"/>
-              <a:t>Contenidos transversales: Código limpio, </a:t>
-            </a:r>
-            <a:r>
-              <a:rPr lang="es-ES" dirty="0" err="1" smtClean="0"/>
-              <a:t>Tests</a:t>
-            </a:r>
-            <a:r>
-              <a:rPr lang="es-ES" dirty="0" smtClean="0"/>
-              <a:t> unitarios, Calidad del código-</a:t>
-            </a:r>
-            <a:r>
-              <a:rPr lang="es-ES" dirty="0" err="1" smtClean="0"/>
-              <a:t>sonarQube</a:t>
-            </a:r>
-            <a:endParaRPr lang="es-ES" dirty="0" smtClean="0"/>
-          </a:p>
-          <a:p>
-            <a:r>
-              <a:rPr lang="es-ES" dirty="0" smtClean="0"/>
-              <a:t>Clases de modelo (Documento y Expediente).</a:t>
+              <a:rPr lang="es-ES" sz="1400" dirty="0"/>
+              <a:t>	1.3</a:t>
+            </a:r>
+            <a:r>
+              <a:rPr lang="es-ES" sz="1400" dirty="0" smtClean="0"/>
+              <a:t>. Principios SOLID.</a:t>
             </a:r>
           </a:p>
           <a:p>
@@ -10863,31 +10793,15 @@
               <a:buNone/>
             </a:pPr>
             <a:r>
-              <a:rPr lang="es-ES" dirty="0" smtClean="0"/>
-              <a:t>	3.1. </a:t>
-            </a:r>
-            <a:r>
-              <a:rPr lang="es-ES" dirty="0" err="1"/>
-              <a:t>hashCode</a:t>
-            </a:r>
-            <a:r>
-              <a:rPr lang="es-ES" dirty="0"/>
-              <a:t>, </a:t>
-            </a:r>
-            <a:r>
-              <a:rPr lang="es-ES" dirty="0" err="1"/>
-              <a:t>equals</a:t>
-            </a:r>
-            <a:r>
-              <a:rPr lang="es-ES" dirty="0"/>
-              <a:t> y </a:t>
-            </a:r>
-            <a:r>
-              <a:rPr lang="es-ES" dirty="0" err="1" smtClean="0"/>
-              <a:t>toString</a:t>
-            </a:r>
-            <a:r>
-              <a:rPr lang="es-ES" dirty="0" smtClean="0"/>
+              <a:rPr lang="es-ES" sz="1400" dirty="0" smtClean="0"/>
+              <a:t>	1.4. Calidad estática del código </a:t>
+            </a:r>
+            <a:r>
+              <a:rPr lang="es-ES" sz="1400" dirty="0" err="1" smtClean="0"/>
+              <a:t>SonarQube</a:t>
+            </a:r>
+            <a:r>
+              <a:rPr lang="es-ES" sz="1400" dirty="0" smtClean="0"/>
               <a:t>.</a:t>
             </a:r>
           </a:p>
@@ -10896,16 +10810,54 @@
               <a:buNone/>
             </a:pPr>
             <a:r>
+              <a:rPr lang="es-ES" sz="1400" dirty="0"/>
+              <a:t>	</a:t>
+            </a:r>
+            <a:r>
+              <a:rPr lang="es-ES" sz="1400" dirty="0" smtClean="0"/>
+              <a:t>1.5. Software de control de versiones: </a:t>
+            </a:r>
+            <a:r>
+              <a:rPr lang="es-ES" sz="1400" dirty="0" err="1" smtClean="0"/>
+              <a:t>Git</a:t>
+            </a:r>
+            <a:r>
+              <a:rPr lang="es-ES" sz="1400" dirty="0" smtClean="0"/>
+              <a:t>, </a:t>
+            </a:r>
+            <a:r>
+              <a:rPr lang="es-ES" sz="1400" dirty="0" err="1" smtClean="0"/>
+              <a:t>GitHub</a:t>
+            </a:r>
+            <a:r>
+              <a:rPr lang="es-ES" sz="1400" dirty="0" smtClean="0"/>
+              <a:t> y </a:t>
+            </a:r>
+            <a:r>
+              <a:rPr lang="es-ES" sz="1400" dirty="0" err="1" smtClean="0"/>
+              <a:t>SourceTree</a:t>
+            </a:r>
+            <a:r>
+              <a:rPr lang="es-ES" sz="1400" dirty="0" smtClean="0"/>
+              <a:t>.</a:t>
+            </a:r>
+          </a:p>
+          <a:p>
+            <a:pPr>
+              <a:buFont typeface="+mj-lt"/>
+              <a:buAutoNum type="arabicPeriod" startAt="2"/>
+            </a:pPr>
+            <a:r>
               <a:rPr lang="es-ES" dirty="0" smtClean="0"/>
-              <a:t>	3.2. Inmutabilidad y </a:t>
-            </a:r>
-            <a:r>
-              <a:rPr lang="es-ES" dirty="0" err="1" smtClean="0"/>
-              <a:t>builders</a:t>
+              <a:t>Estructura </a:t>
+            </a:r>
+            <a:r>
+              <a:rPr lang="es-ES" dirty="0"/>
+              <a:t>de </a:t>
             </a:r>
             <a:r>
               <a:rPr lang="es-ES" dirty="0" smtClean="0"/>
-              <a:t> (patrones de diseño).</a:t>
+              <a:t>un proyecto.</a:t>
             </a:r>
           </a:p>
           <a:p>
@@ -10913,16 +10865,20 @@
               <a:buNone/>
             </a:pPr>
             <a:r>
-              <a:rPr lang="es-ES" dirty="0" smtClean="0"/>
-              <a:t>	3.3. </a:t>
-            </a:r>
-            <a:r>
-              <a:rPr lang="es-ES" dirty="0" err="1" smtClean="0"/>
-              <a:t>Tests</a:t>
-            </a:r>
-            <a:r>
-              <a:rPr lang="es-ES" dirty="0" smtClean="0"/>
-              <a:t> unitarios.</a:t>
+              <a:rPr lang="es-ES" sz="1400" dirty="0"/>
+              <a:t>	</a:t>
+            </a:r>
+            <a:r>
+              <a:rPr lang="es-ES" sz="1400" dirty="0" smtClean="0"/>
+              <a:t>2.1. </a:t>
+            </a:r>
+            <a:r>
+              <a:rPr lang="es-ES" sz="1400" dirty="0" err="1" smtClean="0"/>
+              <a:t>main</a:t>
+            </a:r>
+            <a:r>
+              <a:rPr lang="es-ES" sz="1400" dirty="0" smtClean="0"/>
+              <a:t> vs test.</a:t>
             </a:r>
           </a:p>
           <a:p>
@@ -10930,33 +10886,379 @@
               <a:buNone/>
             </a:pPr>
             <a:r>
+              <a:rPr lang="es-ES" sz="1400" dirty="0"/>
+              <a:t>	</a:t>
+            </a:r>
+            <a:r>
+              <a:rPr lang="es-ES" sz="1400" dirty="0" smtClean="0"/>
+              <a:t>2.2. java vs </a:t>
+            </a:r>
+            <a:r>
+              <a:rPr lang="es-ES" sz="1400" dirty="0" err="1" smtClean="0"/>
+              <a:t>resources</a:t>
+            </a:r>
+            <a:r>
+              <a:rPr lang="es-ES" sz="1400" dirty="0" smtClean="0"/>
+              <a:t>.</a:t>
+            </a:r>
+          </a:p>
+          <a:p>
+            <a:pPr marL="77787" lvl="1" indent="0">
+              <a:buNone/>
+            </a:pPr>
+            <a:r>
+              <a:rPr lang="es-ES" sz="1400" dirty="0"/>
+              <a:t>	2</a:t>
+            </a:r>
+            <a:r>
+              <a:rPr lang="es-ES" sz="1400" dirty="0" smtClean="0"/>
+              <a:t>.3. Paquetes: modelo</a:t>
+            </a:r>
+            <a:r>
+              <a:rPr lang="es-ES" sz="1400" dirty="0"/>
+              <a:t>, repositorio y </a:t>
+            </a:r>
+            <a:r>
+              <a:rPr lang="es-ES" sz="1400" dirty="0" smtClean="0"/>
+              <a:t>servicio.</a:t>
+            </a:r>
+            <a:endParaRPr lang="es-ES" sz="1400" dirty="0"/>
+          </a:p>
+          <a:p>
+            <a:pPr>
+              <a:buAutoNum type="arabicPeriod" startAt="2"/>
+            </a:pPr>
+            <a:r>
               <a:rPr lang="es-ES" dirty="0" smtClean="0"/>
-              <a:t>	3.4. Herencia (</a:t>
+              <a:t>Creación de un proyecto con </a:t>
             </a:r>
             <a:r>
               <a:rPr lang="es-ES" dirty="0" err="1" smtClean="0"/>
+              <a:t>SpringBoot</a:t>
+            </a:r>
+            <a:r>
+              <a:rPr lang="es-ES" dirty="0" smtClean="0"/>
+              <a:t> y </a:t>
+            </a:r>
+            <a:r>
+              <a:rPr lang="es-ES" dirty="0" err="1" smtClean="0"/>
+              <a:t>Maven</a:t>
+            </a:r>
+            <a:r>
+              <a:rPr lang="es-ES" dirty="0" smtClean="0"/>
+              <a:t>.</a:t>
+            </a:r>
+          </a:p>
+          <a:p>
+            <a:pPr marL="77787" lvl="1" indent="0">
+              <a:buNone/>
+            </a:pPr>
+            <a:r>
+              <a:rPr lang="es-ES" sz="1400" dirty="0"/>
+              <a:t>	</a:t>
+            </a:r>
+            <a:r>
+              <a:rPr lang="es-ES" sz="1400" dirty="0" smtClean="0"/>
+              <a:t>3.1</a:t>
+            </a:r>
+            <a:r>
+              <a:rPr lang="es-ES" sz="1400" dirty="0"/>
+              <a:t>. </a:t>
+            </a:r>
+            <a:r>
+              <a:rPr lang="es-ES" sz="1400" dirty="0" smtClean="0"/>
+              <a:t>Introducción a Spring.</a:t>
+            </a:r>
+          </a:p>
+          <a:p>
+            <a:pPr marL="77787" lvl="1" indent="0">
+              <a:buNone/>
+            </a:pPr>
+            <a:r>
+              <a:rPr lang="es-ES" sz="1400" dirty="0" smtClean="0"/>
+              <a:t>	3.2. Creación de un proyecto desde cero con </a:t>
+            </a:r>
+            <a:r>
+              <a:rPr lang="es-ES" sz="1400" dirty="0" err="1" smtClean="0"/>
+              <a:t>SpringBoot</a:t>
+            </a:r>
+            <a:r>
+              <a:rPr lang="es-ES" sz="1400" dirty="0" smtClean="0"/>
+              <a:t> </a:t>
+            </a:r>
+            <a:r>
+              <a:rPr lang="es-ES" sz="1400" dirty="0" err="1" smtClean="0"/>
+              <a:t>initializr</a:t>
+            </a:r>
+            <a:r>
+              <a:rPr lang="es-ES" sz="1400" dirty="0" smtClean="0"/>
+              <a:t>.</a:t>
+            </a:r>
+            <a:endParaRPr lang="es-ES" sz="1400" dirty="0"/>
+          </a:p>
+          <a:p>
+            <a:pPr marL="77787" lvl="1" indent="0">
+              <a:buNone/>
+            </a:pPr>
+            <a:r>
+              <a:rPr lang="es-ES" sz="1400" dirty="0"/>
+              <a:t>	</a:t>
+            </a:r>
+            <a:r>
+              <a:rPr lang="es-ES" sz="1400" dirty="0" smtClean="0"/>
+              <a:t>3.2</a:t>
+            </a:r>
+            <a:r>
+              <a:rPr lang="es-ES" sz="1400" dirty="0"/>
+              <a:t>. </a:t>
+            </a:r>
+            <a:r>
+              <a:rPr lang="es-ES" sz="1400" dirty="0" smtClean="0"/>
+              <a:t>Importación de proyectos </a:t>
+            </a:r>
+            <a:r>
+              <a:rPr lang="es-ES" sz="1400" dirty="0" err="1" smtClean="0"/>
+              <a:t>maven</a:t>
+            </a:r>
+            <a:r>
+              <a:rPr lang="es-ES" sz="1400" dirty="0" smtClean="0"/>
+              <a:t> en Eclipse.</a:t>
+            </a:r>
+            <a:endParaRPr lang="es-ES" sz="1400" dirty="0"/>
+          </a:p>
+        </p:txBody>
+      </p:sp>
+    </p:spTree>
+    <p:extLst>
+      <p:ext uri="{BB962C8B-B14F-4D97-AF65-F5344CB8AC3E}">
+        <p14:creationId xmlns:p14="http://schemas.microsoft.com/office/powerpoint/2010/main" val="3233608940"/>
+      </p:ext>
+    </p:extLst>
+  </p:cSld>
+  <p:clrMapOvr>
+    <a:masterClrMapping/>
+  </p:clrMapOvr>
+  <p:timing>
+    <p:tnLst>
+      <p:par>
+        <p:cTn id="1" dur="indefinite" restart="never" nodeType="tmRoot"/>
+      </p:par>
+    </p:tnLst>
+  </p:timing>
+</p:sld>
+</file>
+
+<file path=ppt/slides/slide3.xml><?xml version="1.0" encoding="utf-8"?>
+<p:sld xmlns:a="http://schemas.openxmlformats.org/drawingml/2006/main" xmlns:r="http://schemas.openxmlformats.org/officeDocument/2006/relationships" xmlns:p="http://schemas.openxmlformats.org/presentationml/2006/main">
+  <p:cSld>
+    <p:spTree>
+      <p:nvGrpSpPr>
+        <p:cNvPr id="1" name=""/>
+        <p:cNvGrpSpPr/>
+        <p:nvPr/>
+      </p:nvGrpSpPr>
+      <p:grpSpPr>
+        <a:xfrm>
+          <a:off x="0" y="0"/>
+          <a:ext cx="0" cy="0"/>
+          <a:chOff x="0" y="0"/>
+          <a:chExt cx="0" cy="0"/>
+        </a:xfrm>
+      </p:grpSpPr>
+      <p:sp>
+        <p:nvSpPr>
+          <p:cNvPr id="2" name="Título 1"/>
+          <p:cNvSpPr>
+            <a:spLocks noGrp="1"/>
+          </p:cNvSpPr>
+          <p:nvPr>
+            <p:ph type="title"/>
+          </p:nvPr>
+        </p:nvSpPr>
+        <p:spPr/>
+        <p:txBody>
+          <a:bodyPr/>
+          <a:lstStyle/>
+          <a:p>
+            <a:r>
+              <a:rPr lang="es-ES" dirty="0" smtClean="0"/>
+              <a:t>Contenido (2)</a:t>
+            </a:r>
+            <a:endParaRPr lang="es-ES" dirty="0"/>
+          </a:p>
+        </p:txBody>
+      </p:sp>
+      <p:sp>
+        <p:nvSpPr>
+          <p:cNvPr id="3" name="Marcador de contenido 2"/>
+          <p:cNvSpPr>
+            <a:spLocks noGrp="1"/>
+          </p:cNvSpPr>
+          <p:nvPr>
+            <p:ph idx="1"/>
+          </p:nvPr>
+        </p:nvSpPr>
+        <p:spPr/>
+        <p:txBody>
+          <a:bodyPr/>
+          <a:lstStyle/>
+          <a:p>
+            <a:pPr>
+              <a:buFont typeface="+mj-lt"/>
+              <a:buAutoNum type="arabicPeriod" startAt="4"/>
+            </a:pPr>
+            <a:endParaRPr lang="es-ES" dirty="0" smtClean="0"/>
+          </a:p>
+          <a:p>
+            <a:pPr>
+              <a:buFont typeface="+mj-lt"/>
+              <a:buAutoNum type="arabicPeriod" startAt="4"/>
+            </a:pPr>
+            <a:r>
+              <a:rPr lang="es-ES" dirty="0" smtClean="0"/>
+              <a:t>Clases </a:t>
+            </a:r>
+            <a:r>
+              <a:rPr lang="es-ES" dirty="0"/>
+              <a:t>de modelo (Documento y Expediente).</a:t>
+            </a:r>
+          </a:p>
+          <a:p>
+            <a:pPr marL="77787" lvl="1" indent="0">
+              <a:buNone/>
+            </a:pPr>
+            <a:r>
+              <a:rPr lang="es-ES" dirty="0"/>
+              <a:t>	</a:t>
+            </a:r>
+            <a:r>
+              <a:rPr lang="es-ES" sz="1400" dirty="0" smtClean="0"/>
+              <a:t>4.1</a:t>
+            </a:r>
+            <a:r>
+              <a:rPr lang="es-ES" sz="1400" dirty="0"/>
+              <a:t>. </a:t>
+            </a:r>
+            <a:r>
+              <a:rPr lang="es-ES" sz="1400" dirty="0" err="1"/>
+              <a:t>hashCode</a:t>
+            </a:r>
+            <a:r>
+              <a:rPr lang="es-ES" sz="1400" dirty="0"/>
+              <a:t>, </a:t>
+            </a:r>
+            <a:r>
+              <a:rPr lang="es-ES" sz="1400" dirty="0" err="1"/>
+              <a:t>equals</a:t>
+            </a:r>
+            <a:r>
+              <a:rPr lang="es-ES" sz="1400" dirty="0"/>
+              <a:t> y </a:t>
+            </a:r>
+            <a:r>
+              <a:rPr lang="es-ES" sz="1400" dirty="0" err="1"/>
+              <a:t>toString</a:t>
+            </a:r>
+            <a:r>
+              <a:rPr lang="es-ES" sz="1400" dirty="0"/>
+              <a:t>.</a:t>
+            </a:r>
+          </a:p>
+          <a:p>
+            <a:pPr marL="77787" lvl="1" indent="0">
+              <a:buNone/>
+            </a:pPr>
+            <a:r>
+              <a:rPr lang="es-ES" sz="1400" dirty="0"/>
+              <a:t>	</a:t>
+            </a:r>
+            <a:r>
+              <a:rPr lang="es-ES" sz="1400" dirty="0" smtClean="0"/>
+              <a:t>4.2</a:t>
+            </a:r>
+            <a:r>
+              <a:rPr lang="es-ES" sz="1400" dirty="0"/>
+              <a:t>. Inmutabilidad y </a:t>
+            </a:r>
+            <a:r>
+              <a:rPr lang="es-ES" sz="1400" dirty="0" err="1"/>
+              <a:t>builders</a:t>
+            </a:r>
+            <a:r>
+              <a:rPr lang="es-ES" sz="1400" dirty="0"/>
+              <a:t> (patrones de diseño).</a:t>
+            </a:r>
+          </a:p>
+          <a:p>
+            <a:pPr marL="77787" lvl="1" indent="0">
+              <a:buNone/>
+            </a:pPr>
+            <a:r>
+              <a:rPr lang="es-ES" sz="1400" dirty="0"/>
+              <a:t>	</a:t>
+            </a:r>
+            <a:r>
+              <a:rPr lang="es-ES" sz="1400" dirty="0" smtClean="0"/>
+              <a:t>4.3</a:t>
+            </a:r>
+            <a:r>
+              <a:rPr lang="es-ES" sz="1400" dirty="0"/>
+              <a:t>. </a:t>
+            </a:r>
+            <a:r>
+              <a:rPr lang="es-ES" sz="1400" dirty="0" err="1"/>
+              <a:t>Tests</a:t>
+            </a:r>
+            <a:r>
+              <a:rPr lang="es-ES" sz="1400" dirty="0"/>
+              <a:t> unitarios.</a:t>
+            </a:r>
+          </a:p>
+          <a:p>
+            <a:pPr marL="77787" lvl="1" indent="0">
+              <a:buNone/>
+            </a:pPr>
+            <a:r>
+              <a:rPr lang="es-ES" sz="1400" dirty="0"/>
+              <a:t>	</a:t>
+            </a:r>
+            <a:r>
+              <a:rPr lang="es-ES" sz="1400" dirty="0" smtClean="0"/>
+              <a:t>4.4</a:t>
+            </a:r>
+            <a:r>
+              <a:rPr lang="es-ES" sz="1400" dirty="0"/>
+              <a:t>. Herencia </a:t>
+            </a:r>
+            <a:r>
+              <a:rPr lang="es-ES" sz="1400" dirty="0" smtClean="0"/>
+              <a:t>(Clase base y especialización de Documento: </a:t>
+            </a:r>
+            <a:r>
+              <a:rPr lang="es-ES" sz="1400" dirty="0" err="1" smtClean="0"/>
               <a:t>DocumentoContable</a:t>
             </a:r>
             <a:r>
-              <a:rPr lang="es-ES" dirty="0" smtClean="0"/>
+              <a:rPr lang="es-ES" sz="1400" dirty="0"/>
               <a:t>, </a:t>
             </a:r>
             <a:r>
-              <a:rPr lang="es-ES" dirty="0" err="1" smtClean="0"/>
+              <a:rPr lang="es-ES" sz="1400" dirty="0" err="1" smtClean="0"/>
               <a:t>DocumentoRegistro</a:t>
             </a:r>
             <a:r>
-              <a:rPr lang="es-ES" dirty="0" smtClean="0"/>
-              <a:t>, </a:t>
-            </a:r>
-            <a:r>
-              <a:rPr lang="es-ES" dirty="0" err="1" smtClean="0"/>
+              <a:rPr lang="es-ES" sz="1400" dirty="0" smtClean="0"/>
+              <a:t> y </a:t>
+            </a:r>
+            <a:r>
+              <a:rPr lang="es-ES" sz="1400" dirty="0" err="1" smtClean="0"/>
               <a:t>DocumentoPropuesta</a:t>
             </a:r>
             <a:r>
-              <a:rPr lang="es-ES" dirty="0" smtClean="0"/>
-              <a:t>…).</a:t>
-            </a:r>
+              <a:rPr lang="es-ES" sz="1400" dirty="0" smtClean="0"/>
+              <a:t>).</a:t>
+            </a:r>
+            <a:endParaRPr lang="es-ES" sz="1400" dirty="0"/>
           </a:p>
           <a:p>
             <a:pPr>
@@ -10965,16 +11267,115 @@
             </a:pPr>
             <a:r>
               <a:rPr lang="es-ES" dirty="0" smtClean="0"/>
-              <a:t>Repositorios</a:t>
-            </a:r>
-            <a:r>
-              <a:rPr lang="es-ES" dirty="0"/>
-              <a:t>. (Documento y Expediente – alta/modificación/eliminación</a:t>
-            </a:r>
-            <a:r>
-              <a:rPr lang="es-ES" dirty="0" smtClean="0"/>
-              <a:t>). TDD</a:t>
-            </a:r>
+              <a:t>Repositorios (Alta, modificación, eliminación y consulta). </a:t>
+            </a:r>
+          </a:p>
+          <a:p>
+            <a:pPr marL="77787" lvl="1" indent="0">
+              <a:buNone/>
+            </a:pPr>
+            <a:r>
+              <a:rPr lang="es-ES" sz="1400" dirty="0" smtClean="0"/>
+              <a:t>	5.1. Interfaz vs implementación</a:t>
+            </a:r>
+          </a:p>
+          <a:p>
+            <a:pPr marL="77787" lvl="1" indent="0">
+              <a:buNone/>
+            </a:pPr>
+            <a:r>
+              <a:rPr lang="es-ES" sz="1400" dirty="0"/>
+              <a:t>	</a:t>
+            </a:r>
+            <a:r>
+              <a:rPr lang="es-ES" sz="1400" dirty="0" smtClean="0"/>
+              <a:t>5.2</a:t>
+            </a:r>
+            <a:r>
+              <a:rPr lang="es-ES" sz="1400" dirty="0"/>
+              <a:t>. </a:t>
+            </a:r>
+            <a:r>
+              <a:rPr lang="es-ES" sz="1400" dirty="0" smtClean="0"/>
+              <a:t>Implementación con lista en memoria.</a:t>
+            </a:r>
+            <a:endParaRPr lang="es-ES" sz="1400" dirty="0"/>
+          </a:p>
+          <a:p>
+            <a:pPr marL="77787" lvl="1" indent="0">
+              <a:buNone/>
+            </a:pPr>
+            <a:r>
+              <a:rPr lang="es-ES" sz="1400" dirty="0"/>
+              <a:t>	</a:t>
+            </a:r>
+            <a:r>
+              <a:rPr lang="es-ES" sz="1400" dirty="0" smtClean="0"/>
+              <a:t>5.3</a:t>
+            </a:r>
+            <a:r>
+              <a:rPr lang="es-ES" sz="1400" dirty="0"/>
+              <a:t>. </a:t>
+            </a:r>
+            <a:r>
+              <a:rPr lang="es-ES" sz="1400" dirty="0" smtClean="0"/>
+              <a:t>TDD.  Test </a:t>
+            </a:r>
+            <a:r>
+              <a:rPr lang="es-ES" sz="1400" dirty="0" err="1" smtClean="0"/>
+              <a:t>Development</a:t>
+            </a:r>
+            <a:r>
+              <a:rPr lang="es-ES" sz="1400" dirty="0" smtClean="0"/>
+              <a:t> </a:t>
+            </a:r>
+            <a:r>
+              <a:rPr lang="es-ES" sz="1400" dirty="0" err="1" smtClean="0"/>
+              <a:t>Driven</a:t>
+            </a:r>
+            <a:r>
+              <a:rPr lang="es-ES" sz="1400" dirty="0" smtClean="0"/>
+              <a:t> (Desarrollo guiado por pruebas).</a:t>
+            </a:r>
+            <a:endParaRPr lang="es-ES" sz="1400" dirty="0"/>
+          </a:p>
+          <a:p>
+            <a:pPr marL="77787" lvl="1" indent="0">
+              <a:buNone/>
+            </a:pPr>
+            <a:r>
+              <a:rPr lang="es-ES" sz="1400" dirty="0"/>
+              <a:t>	</a:t>
+            </a:r>
+            <a:r>
+              <a:rPr lang="es-ES" sz="1400" dirty="0" smtClean="0"/>
+              <a:t>5.4</a:t>
+            </a:r>
+            <a:r>
+              <a:rPr lang="es-ES" sz="1400" dirty="0"/>
+              <a:t>. </a:t>
+            </a:r>
+            <a:r>
+              <a:rPr lang="es-ES" sz="1400" dirty="0" smtClean="0"/>
+              <a:t>Introducción novedades Java 8 (</a:t>
+            </a:r>
+            <a:r>
+              <a:rPr lang="es-ES" sz="1400" dirty="0" err="1" smtClean="0"/>
+              <a:t>Streams</a:t>
+            </a:r>
+            <a:r>
+              <a:rPr lang="es-ES" sz="1400" dirty="0" smtClean="0"/>
+              <a:t>, Lambdas y </a:t>
+            </a:r>
+            <a:r>
+              <a:rPr lang="es-ES" sz="1400" dirty="0" err="1" smtClean="0"/>
+              <a:t>Optional</a:t>
+            </a:r>
+            <a:r>
+              <a:rPr lang="es-ES" sz="1400" dirty="0" smtClean="0"/>
+              <a:t>).</a:t>
+            </a:r>
+            <a:endParaRPr lang="es-ES" sz="1400" dirty="0"/>
           </a:p>
           <a:p>
             <a:pPr>
@@ -10983,26 +11384,425 @@
             </a:pPr>
             <a:r>
               <a:rPr lang="es-ES" dirty="0" smtClean="0"/>
-              <a:t>Servicios.    (Documento y Expediente – alta/modificación/eliminación). TDD      </a:t>
-            </a:r>
-          </a:p>
+              <a:t>Servicios (Alta, modificación, eliminación y consulta). </a:t>
+            </a:r>
+          </a:p>
+          <a:p>
+            <a:pPr marL="77787" lvl="1" indent="0">
+              <a:buNone/>
+            </a:pPr>
+            <a:r>
+              <a:rPr lang="es-ES" sz="1400" dirty="0" smtClean="0"/>
+              <a:t>	6.1</a:t>
+            </a:r>
+            <a:r>
+              <a:rPr lang="es-ES" sz="1400" dirty="0"/>
+              <a:t>. Interfaz vs implementación</a:t>
+            </a:r>
+          </a:p>
+          <a:p>
+            <a:pPr marL="77787" lvl="1" indent="0">
+              <a:buNone/>
+            </a:pPr>
+            <a:r>
+              <a:rPr lang="es-ES" sz="1400" dirty="0"/>
+              <a:t>	</a:t>
+            </a:r>
+            <a:r>
+              <a:rPr lang="es-ES" sz="1400" dirty="0" smtClean="0"/>
+              <a:t>6.2</a:t>
+            </a:r>
+            <a:r>
+              <a:rPr lang="es-ES" sz="1400" dirty="0"/>
+              <a:t>. Implementación </a:t>
+            </a:r>
+            <a:r>
+              <a:rPr lang="es-ES" sz="1400" dirty="0" smtClean="0"/>
+              <a:t>del servicio desacoplada de la implementación del repositorio.</a:t>
+            </a:r>
+          </a:p>
+          <a:p>
+            <a:pPr marL="0" indent="0">
+              <a:buNone/>
+            </a:pPr>
+            <a:endParaRPr lang="es-ES" dirty="0"/>
+          </a:p>
+        </p:txBody>
+      </p:sp>
+      <p:sp>
+        <p:nvSpPr>
+          <p:cNvPr id="4" name="Marcador de fecha 3"/>
+          <p:cNvSpPr>
+            <a:spLocks noGrp="1"/>
+          </p:cNvSpPr>
+          <p:nvPr>
+            <p:ph type="dt" sz="half" idx="10"/>
+          </p:nvPr>
+        </p:nvSpPr>
+        <p:spPr/>
+        <p:txBody>
+          <a:bodyPr/>
+          <a:lstStyle/>
           <a:p>
             <a:pPr>
-              <a:buFont typeface="+mj-lt"/>
-              <a:buAutoNum type="arabicPeriod" startAt="5"/>
+              <a:defRPr/>
             </a:pPr>
-            <a:r>
-              <a:rPr lang="es-ES" dirty="0" smtClean="0"/>
-              <a:t>Controlador API REST                                                                                                                    </a:t>
-            </a:r>
-            <a:endParaRPr lang="es-ES" dirty="0"/>
+            <a:fld id="{BEDFDCAD-79B2-49A7-84F3-F37C65B12F37}" type="datetime5">
+              <a:rPr lang="es-ES_tradnl" smtClean="0"/>
+              <a:t>26-mar-18</a:t>
+            </a:fld>
+            <a:endParaRPr lang="fr-FR" dirty="0"/>
+          </a:p>
+        </p:txBody>
+      </p:sp>
+      <p:sp>
+        <p:nvSpPr>
+          <p:cNvPr id="5" name="Marcador de pie de página 4"/>
+          <p:cNvSpPr>
+            <a:spLocks noGrp="1"/>
+          </p:cNvSpPr>
+          <p:nvPr>
+            <p:ph type="ftr" sz="quarter" idx="11"/>
+          </p:nvPr>
+        </p:nvSpPr>
+        <p:spPr/>
+        <p:txBody>
+          <a:bodyPr/>
+          <a:lstStyle/>
+          <a:p>
+            <a:pPr>
+              <a:defRPr/>
+            </a:pPr>
+            <a:r>
+              <a:rPr lang="es-ES" smtClean="0"/>
+              <a:t>Editar título: Insertar &gt; encabezado y pie de página &gt; completar el título y luego "aplicar en todas partes"</a:t>
+            </a:r>
+            <a:endParaRPr lang="fr-FR" dirty="0"/>
+          </a:p>
+        </p:txBody>
+      </p:sp>
+      <p:sp>
+        <p:nvSpPr>
+          <p:cNvPr id="6" name="Marcador de número de diapositiva 5"/>
+          <p:cNvSpPr>
+            <a:spLocks noGrp="1"/>
+          </p:cNvSpPr>
+          <p:nvPr>
+            <p:ph type="sldNum" sz="quarter" idx="12"/>
+          </p:nvPr>
+        </p:nvSpPr>
+        <p:spPr/>
+        <p:txBody>
+          <a:bodyPr/>
+          <a:lstStyle/>
+          <a:p>
+            <a:pPr>
+              <a:defRPr/>
+            </a:pPr>
+            <a:fld id="{96F96888-0FE2-47FE-ADBE-6367A9801EBE}" type="slidenum">
+              <a:rPr lang="fr-FR" smtClean="0"/>
+              <a:pPr>
+                <a:defRPr/>
+              </a:pPr>
+              <a:t>3</a:t>
+            </a:fld>
+            <a:endParaRPr lang="fr-FR"/>
           </a:p>
         </p:txBody>
       </p:sp>
     </p:spTree>
     <p:extLst>
       <p:ext uri="{BB962C8B-B14F-4D97-AF65-F5344CB8AC3E}">
-        <p14:creationId xmlns:p14="http://schemas.microsoft.com/office/powerpoint/2010/main" val="3233608940"/>
+        <p14:creationId xmlns:p14="http://schemas.microsoft.com/office/powerpoint/2010/main" val="2176182905"/>
+      </p:ext>
+    </p:extLst>
+  </p:cSld>
+  <p:clrMapOvr>
+    <a:masterClrMapping/>
+  </p:clrMapOvr>
+  <p:timing>
+    <p:tnLst>
+      <p:par>
+        <p:cTn id="1" dur="indefinite" restart="never" nodeType="tmRoot"/>
+      </p:par>
+    </p:tnLst>
+  </p:timing>
+</p:sld>
+</file>
+
+<file path=ppt/slides/slide4.xml><?xml version="1.0" encoding="utf-8"?>
+<p:sld xmlns:a="http://schemas.openxmlformats.org/drawingml/2006/main" xmlns:r="http://schemas.openxmlformats.org/officeDocument/2006/relationships" xmlns:p="http://schemas.openxmlformats.org/presentationml/2006/main">
+  <p:cSld>
+    <p:spTree>
+      <p:nvGrpSpPr>
+        <p:cNvPr id="1" name=""/>
+        <p:cNvGrpSpPr/>
+        <p:nvPr/>
+      </p:nvGrpSpPr>
+      <p:grpSpPr>
+        <a:xfrm>
+          <a:off x="0" y="0"/>
+          <a:ext cx="0" cy="0"/>
+          <a:chOff x="0" y="0"/>
+          <a:chExt cx="0" cy="0"/>
+        </a:xfrm>
+      </p:grpSpPr>
+      <p:sp>
+        <p:nvSpPr>
+          <p:cNvPr id="2" name="Título 1"/>
+          <p:cNvSpPr>
+            <a:spLocks noGrp="1"/>
+          </p:cNvSpPr>
+          <p:nvPr>
+            <p:ph type="title"/>
+          </p:nvPr>
+        </p:nvSpPr>
+        <p:spPr/>
+        <p:txBody>
+          <a:bodyPr/>
+          <a:lstStyle/>
+          <a:p>
+            <a:r>
+              <a:rPr lang="es-ES" dirty="0" smtClean="0"/>
+              <a:t>Contenido (3)</a:t>
+            </a:r>
+            <a:endParaRPr lang="es-ES" dirty="0"/>
+          </a:p>
+        </p:txBody>
+      </p:sp>
+      <p:sp>
+        <p:nvSpPr>
+          <p:cNvPr id="3" name="Marcador de contenido 2"/>
+          <p:cNvSpPr>
+            <a:spLocks noGrp="1"/>
+          </p:cNvSpPr>
+          <p:nvPr>
+            <p:ph idx="1"/>
+          </p:nvPr>
+        </p:nvSpPr>
+        <p:spPr/>
+        <p:txBody>
+          <a:bodyPr/>
+          <a:lstStyle/>
+          <a:p>
+            <a:pPr>
+              <a:buFont typeface="+mj-lt"/>
+              <a:buAutoNum type="arabicPeriod" startAt="7"/>
+            </a:pPr>
+            <a:r>
+              <a:rPr lang="es-ES" dirty="0" smtClean="0"/>
+              <a:t>Controlador </a:t>
+            </a:r>
+            <a:r>
+              <a:rPr lang="es-ES" dirty="0"/>
+              <a:t>API REST (consulta de documentos).                                                                                                              </a:t>
+            </a:r>
+          </a:p>
+          <a:p>
+            <a:pPr marL="77787" lvl="1" indent="0">
+              <a:buNone/>
+            </a:pPr>
+            <a:r>
+              <a:rPr lang="es-ES" dirty="0"/>
+              <a:t>	</a:t>
+            </a:r>
+            <a:r>
+              <a:rPr lang="es-ES" sz="1400" dirty="0"/>
+              <a:t>7.1. Introducción servidor web y peticiones </a:t>
+            </a:r>
+            <a:r>
+              <a:rPr lang="es-ES" sz="1400" dirty="0" smtClean="0"/>
+              <a:t>HTTP.</a:t>
+            </a:r>
+            <a:endParaRPr lang="es-ES" sz="1400" dirty="0"/>
+          </a:p>
+          <a:p>
+            <a:pPr marL="77787" lvl="1" indent="0">
+              <a:buNone/>
+            </a:pPr>
+            <a:r>
+              <a:rPr lang="es-ES" sz="1400" dirty="0"/>
+              <a:t>	7.2. Introducción </a:t>
+            </a:r>
+            <a:r>
+              <a:rPr lang="es-ES" sz="1400" dirty="0" smtClean="0"/>
+              <a:t>patrón de diseño modelo / vista / controlador.</a:t>
+            </a:r>
+          </a:p>
+          <a:p>
+            <a:pPr marL="77787" lvl="1" indent="0">
+              <a:buNone/>
+            </a:pPr>
+            <a:r>
+              <a:rPr lang="es-ES" sz="1400" dirty="0"/>
+              <a:t>	</a:t>
+            </a:r>
+            <a:r>
+              <a:rPr lang="es-ES" sz="1400" dirty="0" smtClean="0"/>
+              <a:t>7.3. Introducción API REST.</a:t>
+            </a:r>
+            <a:endParaRPr lang="es-ES" sz="1400" dirty="0"/>
+          </a:p>
+          <a:p>
+            <a:pPr marL="77787" lvl="1" indent="0">
+              <a:buNone/>
+            </a:pPr>
+            <a:r>
+              <a:rPr lang="es-ES" sz="1400" dirty="0"/>
+              <a:t>	</a:t>
+            </a:r>
+            <a:r>
+              <a:rPr lang="es-ES" sz="1400" dirty="0" smtClean="0"/>
+              <a:t>7.4. </a:t>
+            </a:r>
+            <a:r>
+              <a:rPr lang="es-ES" sz="1400" dirty="0" smtClean="0"/>
+              <a:t>Implementación controlador para explotación de los servicios de </a:t>
+            </a:r>
+            <a:r>
+              <a:rPr lang="es-ES" sz="1400" dirty="0" smtClean="0"/>
+              <a:t>consulta </a:t>
+            </a:r>
+            <a:r>
+              <a:rPr lang="es-ES" sz="1400" smtClean="0"/>
+              <a:t>y eliminación </a:t>
+            </a:r>
+            <a:r>
+              <a:rPr lang="es-ES" sz="1400" dirty="0" smtClean="0"/>
+              <a:t>implementados en el punto 6</a:t>
+            </a:r>
+            <a:r>
+              <a:rPr lang="es-ES" sz="1400" dirty="0" smtClean="0"/>
+              <a:t>.</a:t>
+            </a:r>
+          </a:p>
+          <a:p>
+            <a:pPr marL="77787" lvl="1" indent="0">
+              <a:buNone/>
+            </a:pPr>
+            <a:r>
+              <a:rPr lang="es-ES" sz="1400" dirty="0"/>
+              <a:t>	</a:t>
+            </a:r>
+            <a:r>
+              <a:rPr lang="es-ES" sz="1400" dirty="0" smtClean="0"/>
+              <a:t>7.5. </a:t>
+            </a:r>
+            <a:r>
+              <a:rPr lang="es-ES" sz="1400" dirty="0" err="1" smtClean="0"/>
+              <a:t>Postman</a:t>
+            </a:r>
+            <a:r>
+              <a:rPr lang="es-ES" sz="1400" dirty="0" smtClean="0"/>
+              <a:t>: prueba de controlador.</a:t>
+            </a:r>
+            <a:endParaRPr lang="es-ES" sz="1400" dirty="0"/>
+          </a:p>
+          <a:p>
+            <a:pPr marL="77787" lvl="1" indent="0">
+              <a:buNone/>
+            </a:pPr>
+            <a:endParaRPr lang="es-ES" sz="1400" dirty="0"/>
+          </a:p>
+          <a:p>
+            <a:pPr marL="77787" lvl="1" indent="0">
+              <a:buNone/>
+            </a:pPr>
+            <a:endParaRPr lang="es-ES" sz="1400" dirty="0"/>
+          </a:p>
+          <a:p>
+            <a:pPr>
+              <a:buAutoNum type="arabicPeriod" startAt="7"/>
+            </a:pPr>
+            <a:endParaRPr lang="es-ES" dirty="0"/>
+          </a:p>
+        </p:txBody>
+      </p:sp>
+      <p:sp>
+        <p:nvSpPr>
+          <p:cNvPr id="4" name="Marcador de fecha 3"/>
+          <p:cNvSpPr>
+            <a:spLocks noGrp="1"/>
+          </p:cNvSpPr>
+          <p:nvPr>
+            <p:ph type="dt" sz="half" idx="10"/>
+          </p:nvPr>
+        </p:nvSpPr>
+        <p:spPr/>
+        <p:txBody>
+          <a:bodyPr/>
+          <a:lstStyle/>
+          <a:p>
+            <a:pPr>
+              <a:defRPr/>
+            </a:pPr>
+            <a:fld id="{BEDFDCAD-79B2-49A7-84F3-F37C65B12F37}" type="datetime5">
+              <a:rPr lang="es-ES_tradnl" smtClean="0"/>
+              <a:t>26-mar-18</a:t>
+            </a:fld>
+            <a:endParaRPr lang="fr-FR" dirty="0"/>
+          </a:p>
+        </p:txBody>
+      </p:sp>
+      <p:sp>
+        <p:nvSpPr>
+          <p:cNvPr id="5" name="Marcador de pie de página 4"/>
+          <p:cNvSpPr>
+            <a:spLocks noGrp="1"/>
+          </p:cNvSpPr>
+          <p:nvPr>
+            <p:ph type="ftr" sz="quarter" idx="11"/>
+          </p:nvPr>
+        </p:nvSpPr>
+        <p:spPr/>
+        <p:txBody>
+          <a:bodyPr/>
+          <a:lstStyle/>
+          <a:p>
+            <a:pPr>
+              <a:defRPr/>
+            </a:pPr>
+            <a:r>
+              <a:rPr lang="es-ES" smtClean="0"/>
+              <a:t>Editar título: Insertar &gt; encabezado y pie de página &gt; completar el título y luego "aplicar en todas partes"</a:t>
+            </a:r>
+            <a:endParaRPr lang="fr-FR" dirty="0"/>
+          </a:p>
+        </p:txBody>
+      </p:sp>
+      <p:sp>
+        <p:nvSpPr>
+          <p:cNvPr id="6" name="Marcador de número de diapositiva 5"/>
+          <p:cNvSpPr>
+            <a:spLocks noGrp="1"/>
+          </p:cNvSpPr>
+          <p:nvPr>
+            <p:ph type="sldNum" sz="quarter" idx="12"/>
+          </p:nvPr>
+        </p:nvSpPr>
+        <p:spPr/>
+        <p:txBody>
+          <a:bodyPr/>
+          <a:lstStyle/>
+          <a:p>
+            <a:pPr>
+              <a:defRPr/>
+            </a:pPr>
+            <a:fld id="{96F96888-0FE2-47FE-ADBE-6367A9801EBE}" type="slidenum">
+              <a:rPr lang="fr-FR" smtClean="0"/>
+              <a:pPr>
+                <a:defRPr/>
+              </a:pPr>
+              <a:t>4</a:t>
+            </a:fld>
+            <a:endParaRPr lang="fr-FR"/>
+          </a:p>
+        </p:txBody>
+      </p:sp>
+    </p:spTree>
+    <p:extLst>
+      <p:ext uri="{BB962C8B-B14F-4D97-AF65-F5344CB8AC3E}">
+        <p14:creationId xmlns:p14="http://schemas.microsoft.com/office/powerpoint/2010/main" val="2712573052"/>
       </p:ext>
     </p:extLst>
   </p:cSld>

</xml_diff>